<commit_message>
Fixes on algs and DS
</commit_message>
<xml_diff>
--- a/Courses/Software-Sciences/Module-2-DS-and-Algo/12.1-Data Structures-Overview-Basics/12.1-Data Structures-Overview-Basics.pptx
+++ b/Courses/Software-Sciences/Module-2-DS-and-Algo/12.1-Data Structures-Overview-Basics/12.1-Data Structures-Overview-Basics.pptx
@@ -25571,7 +25571,7 @@
             </a:pPr>
             <a:r>
               <a:rPr lang="bg-BG" dirty="0"/>
-              <a:t>Елементите в дървото са </a:t>
+              <a:t>Елементите са </a:t>
             </a:r>
             <a:r>
               <a:rPr lang="bg-BG" b="1" dirty="0">
@@ -25592,7 +25592,7 @@
               </a:buClr>
             </a:pPr>
             <a:r>
-              <a:rPr lang="ru-RU" b="1" dirty="0">
+              <a:rPr lang="ru-RU" b="1">
                 <a:solidFill>
                   <a:schemeClr val="bg1"/>
                 </a:solidFill>
@@ -25601,7 +25601,7 @@
             </a:r>
             <a:r>
               <a:rPr lang="ru-RU" dirty="0"/>
-              <a:t> на дървото връща елементите във </a:t>
+              <a:t> връща елементите във </a:t>
             </a:r>
             <a:r>
               <a:rPr lang="ru-RU" b="1" dirty="0">
@@ -30828,11 +30828,11 @@
   <p:clrMapOvr>
     <a:masterClrMapping/>
   </p:clrMapOvr>
-  <mc:AlternateContent xmlns:mc="http://schemas.openxmlformats.org/markup-compatibility/2006">
-    <mc:Choice xmlns:p14="http://schemas.microsoft.com/office/powerpoint/2010/main" Requires="p14">
+  <mc:AlternateContent xmlns:mc="http://schemas.openxmlformats.org/markup-compatibility/2006" xmlns:p14="http://schemas.microsoft.com/office/powerpoint/2010/main">
+    <mc:Choice Requires="p14">
       <p:transition spd="slow" p14:dur="2000" advClick="0" advTm="5000"/>
     </mc:Choice>
-    <mc:Fallback>
+    <mc:Fallback xmlns="">
       <p:transition spd="slow" advClick="0" advTm="5000"/>
     </mc:Fallback>
   </mc:AlternateContent>
@@ -34854,7 +34854,7 @@
           </a:effectLst>
           <a:extLst>
             <a:ext uri="{909E8E84-426E-40dd-AFC4-6F175D3DCCD1}">
-              <a14:hiddenFill xmlns="" xmlns:a14="http://schemas.microsoft.com/office/drawing/2010/main">
+              <a14:hiddenFill xmlns:a14="http://schemas.microsoft.com/office/drawing/2010/main" xmlns="">
                 <a:solidFill>
                   <a:srgbClr val="FFFFFF"/>
                 </a:solidFill>
@@ -34897,7 +34897,7 @@
           <a:noFill/>
           <a:extLst>
             <a:ext uri="{909E8E84-426E-40dd-AFC4-6F175D3DCCD1}">
-              <a14:hiddenFill xmlns="" xmlns:a14="http://schemas.microsoft.com/office/drawing/2010/main">
+              <a14:hiddenFill xmlns:a14="http://schemas.microsoft.com/office/drawing/2010/main" xmlns="">
                 <a:solidFill>
                   <a:srgbClr val="FFFFFF"/>
                 </a:solidFill>
@@ -35034,7 +35034,7 @@
           <a:effectLst/>
           <a:extLst>
             <a:ext uri="{909E8E84-426E-40dd-AFC4-6F175D3DCCD1}">
-              <a14:hiddenFill xmlns="" xmlns:a14="http://schemas.microsoft.com/office/drawing/2010/main">
+              <a14:hiddenFill xmlns:a14="http://schemas.microsoft.com/office/drawing/2010/main" xmlns="">
                 <a:solidFill>
                   <a:srgbClr val="FFFFFF"/>
                 </a:solidFill>

</xml_diff>